<commit_message>
Added or Modified Some extra files
</commit_message>
<xml_diff>
--- a/Servlets _ JSP.pptx
+++ b/Servlets _ JSP.pptx
@@ -2429,1743 +2429,6 @@
       <dsp:cNvGrpSpPr/>
     </dsp:nvGrpSpPr>
     <dsp:grpSpPr/>
-    <dsp:sp modelId="{9803BE37-3D9A-4C81-90E6-FA9E06BAE000}">
-      <dsp:nvSpPr>
-        <dsp:cNvPr id="0" name=""/>
-        <dsp:cNvSpPr/>
-      </dsp:nvSpPr>
-      <dsp:spPr>
-        <a:xfrm>
-          <a:off x="0" y="3199"/>
-          <a:ext cx="8784976" cy="0"/>
-        </a:xfrm>
-        <a:prstGeom prst="line">
-          <a:avLst/>
-        </a:prstGeom>
-        <a:solidFill>
-          <a:schemeClr val="accent1">
-            <a:hueOff val="0"/>
-            <a:satOff val="0"/>
-            <a:lumOff val="0"/>
-            <a:alphaOff val="0"/>
-          </a:schemeClr>
-        </a:solidFill>
-        <a:ln w="25400" cap="flat" cmpd="sng" algn="ctr">
-          <a:solidFill>
-            <a:schemeClr val="accent1">
-              <a:hueOff val="0"/>
-              <a:satOff val="0"/>
-              <a:lumOff val="0"/>
-              <a:alphaOff val="0"/>
-            </a:schemeClr>
-          </a:solidFill>
-          <a:prstDash val="solid"/>
-        </a:ln>
-        <a:effectLst/>
-      </dsp:spPr>
-      <dsp:style>
-        <a:lnRef idx="2">
-          <a:scrgbClr r="0" g="0" b="0"/>
-        </a:lnRef>
-        <a:fillRef idx="1">
-          <a:scrgbClr r="0" g="0" b="0"/>
-        </a:fillRef>
-        <a:effectRef idx="0">
-          <a:scrgbClr r="0" g="0" b="0"/>
-        </a:effectRef>
-        <a:fontRef idx="minor">
-          <a:schemeClr val="lt1"/>
-        </a:fontRef>
-      </dsp:style>
-    </dsp:sp>
-    <dsp:sp modelId="{D559DA67-C88E-4EC2-9CD0-E84FB41AEDF2}">
-      <dsp:nvSpPr>
-        <dsp:cNvPr id="0" name=""/>
-        <dsp:cNvSpPr/>
-      </dsp:nvSpPr>
-      <dsp:spPr>
-        <a:xfrm>
-          <a:off x="0" y="3199"/>
-          <a:ext cx="1756995" cy="6546329"/>
-        </a:xfrm>
-        <a:prstGeom prst="rect">
-          <a:avLst/>
-        </a:prstGeom>
-        <a:noFill/>
-        <a:ln>
-          <a:noFill/>
-        </a:ln>
-        <a:effectLst/>
-      </dsp:spPr>
-      <dsp:style>
-        <a:lnRef idx="0">
-          <a:scrgbClr r="0" g="0" b="0"/>
-        </a:lnRef>
-        <a:fillRef idx="0">
-          <a:scrgbClr r="0" g="0" b="0"/>
-        </a:fillRef>
-        <a:effectRef idx="0">
-          <a:scrgbClr r="0" g="0" b="0"/>
-        </a:effectRef>
-        <a:fontRef idx="minor"/>
-      </dsp:style>
-      <dsp:txBody>
-        <a:bodyPr spcFirstLastPara="0" vert="horz" wrap="square" lIns="106680" tIns="106680" rIns="106680" bIns="106680" numCol="1" spcCol="1270" anchor="t" anchorCtr="0">
-          <a:noAutofit/>
-        </a:bodyPr>
-        <a:lstStyle/>
-        <a:p>
-          <a:pPr lvl="0" algn="l" defTabSz="1244600">
-            <a:lnSpc>
-              <a:spcPct val="90000"/>
-            </a:lnSpc>
-            <a:spcBef>
-              <a:spcPct val="0"/>
-            </a:spcBef>
-            <a:spcAft>
-              <a:spcPct val="35000"/>
-            </a:spcAft>
-          </a:pPr>
-          <a:r>
-            <a:rPr lang="en-US" sz="2800" kern="1200" smtClean="0"/>
-            <a:t>JSP Tags</a:t>
-          </a:r>
-          <a:endParaRPr lang="en-IN" sz="2800" kern="1200"/>
-        </a:p>
-      </dsp:txBody>
-      <dsp:txXfrm>
-        <a:off x="0" y="3199"/>
-        <a:ext cx="1756995" cy="6546329"/>
-      </dsp:txXfrm>
-    </dsp:sp>
-    <dsp:sp modelId="{169FEA4B-1E82-4E6A-BEDD-652A30B77F03}">
-      <dsp:nvSpPr>
-        <dsp:cNvPr id="0" name=""/>
-        <dsp:cNvSpPr/>
-      </dsp:nvSpPr>
-      <dsp:spPr>
-        <a:xfrm>
-          <a:off x="1888769" y="130098"/>
-          <a:ext cx="4237299" cy="763957"/>
-        </a:xfrm>
-        <a:prstGeom prst="rect">
-          <a:avLst/>
-        </a:prstGeom>
-        <a:noFill/>
-        <a:ln>
-          <a:noFill/>
-        </a:ln>
-        <a:effectLst/>
-      </dsp:spPr>
-      <dsp:style>
-        <a:lnRef idx="0">
-          <a:scrgbClr r="0" g="0" b="0"/>
-        </a:lnRef>
-        <a:fillRef idx="0">
-          <a:scrgbClr r="0" g="0" b="0"/>
-        </a:fillRef>
-        <a:effectRef idx="0">
-          <a:scrgbClr r="0" g="0" b="0"/>
-        </a:effectRef>
-        <a:fontRef idx="minor"/>
-      </dsp:style>
-      <dsp:txBody>
-        <a:bodyPr spcFirstLastPara="0" vert="horz" wrap="square" lIns="91440" tIns="91440" rIns="91440" bIns="91440" numCol="1" spcCol="1270" anchor="t" anchorCtr="0">
-          <a:noAutofit/>
-        </a:bodyPr>
-        <a:lstStyle/>
-        <a:p>
-          <a:pPr lvl="0" algn="l" defTabSz="1066800">
-            <a:lnSpc>
-              <a:spcPct val="90000"/>
-            </a:lnSpc>
-            <a:spcBef>
-              <a:spcPct val="0"/>
-            </a:spcBef>
-            <a:spcAft>
-              <a:spcPct val="35000"/>
-            </a:spcAft>
-          </a:pPr>
-          <a:r>
-            <a:rPr lang="en-US" sz="2400" kern="1200" smtClean="0"/>
-            <a:t>Declaration Tag</a:t>
-          </a:r>
-          <a:endParaRPr lang="en-IN" sz="2400" kern="1200"/>
-        </a:p>
-      </dsp:txBody>
-      <dsp:txXfrm>
-        <a:off x="1888769" y="130098"/>
-        <a:ext cx="4237299" cy="763957"/>
-      </dsp:txXfrm>
-    </dsp:sp>
-    <dsp:sp modelId="{682C346B-0D9A-4F02-8C4D-297BF6C254D8}">
-      <dsp:nvSpPr>
-        <dsp:cNvPr id="0" name=""/>
-        <dsp:cNvSpPr/>
-      </dsp:nvSpPr>
-      <dsp:spPr>
-        <a:xfrm>
-          <a:off x="1756995" y="894056"/>
-          <a:ext cx="7027980" cy="0"/>
-        </a:xfrm>
-        <a:prstGeom prst="line">
-          <a:avLst/>
-        </a:prstGeom>
-        <a:solidFill>
-          <a:schemeClr val="accent1">
-            <a:hueOff val="0"/>
-            <a:satOff val="0"/>
-            <a:lumOff val="0"/>
-            <a:alphaOff val="0"/>
-          </a:schemeClr>
-        </a:solidFill>
-        <a:ln w="25400" cap="flat" cmpd="sng" algn="ctr">
-          <a:solidFill>
-            <a:schemeClr val="accent1">
-              <a:tint val="50000"/>
-              <a:hueOff val="0"/>
-              <a:satOff val="0"/>
-              <a:lumOff val="0"/>
-              <a:alphaOff val="0"/>
-            </a:schemeClr>
-          </a:solidFill>
-          <a:prstDash val="solid"/>
-        </a:ln>
-        <a:effectLst/>
-      </dsp:spPr>
-      <dsp:style>
-        <a:lnRef idx="2">
-          <a:scrgbClr r="0" g="0" b="0"/>
-        </a:lnRef>
-        <a:fillRef idx="1">
-          <a:scrgbClr r="0" g="0" b="0"/>
-        </a:fillRef>
-        <a:effectRef idx="0">
-          <a:scrgbClr r="0" g="0" b="0"/>
-        </a:effectRef>
-        <a:fontRef idx="minor"/>
-      </dsp:style>
-    </dsp:sp>
-    <dsp:sp modelId="{B6942970-8A81-4502-9520-D842EF452133}">
-      <dsp:nvSpPr>
-        <dsp:cNvPr id="0" name=""/>
-        <dsp:cNvSpPr/>
-      </dsp:nvSpPr>
-      <dsp:spPr>
-        <a:xfrm>
-          <a:off x="1888769" y="1020955"/>
-          <a:ext cx="3517228" cy="688960"/>
-        </a:xfrm>
-        <a:prstGeom prst="rect">
-          <a:avLst/>
-        </a:prstGeom>
-        <a:noFill/>
-        <a:ln>
-          <a:noFill/>
-        </a:ln>
-        <a:effectLst/>
-      </dsp:spPr>
-      <dsp:style>
-        <a:lnRef idx="0">
-          <a:scrgbClr r="0" g="0" b="0"/>
-        </a:lnRef>
-        <a:fillRef idx="0">
-          <a:scrgbClr r="0" g="0" b="0"/>
-        </a:fillRef>
-        <a:effectRef idx="0">
-          <a:scrgbClr r="0" g="0" b="0"/>
-        </a:effectRef>
-        <a:fontRef idx="minor"/>
-      </dsp:style>
-      <dsp:txBody>
-        <a:bodyPr spcFirstLastPara="0" vert="horz" wrap="square" lIns="91440" tIns="91440" rIns="91440" bIns="91440" numCol="1" spcCol="1270" anchor="t" anchorCtr="0">
-          <a:noAutofit/>
-        </a:bodyPr>
-        <a:lstStyle/>
-        <a:p>
-          <a:pPr lvl="0" algn="l" defTabSz="1066800">
-            <a:lnSpc>
-              <a:spcPct val="90000"/>
-            </a:lnSpc>
-            <a:spcBef>
-              <a:spcPct val="0"/>
-            </a:spcBef>
-            <a:spcAft>
-              <a:spcPct val="35000"/>
-            </a:spcAft>
-          </a:pPr>
-          <a:r>
-            <a:rPr lang="en-US" sz="2400" kern="1200" smtClean="0"/>
-            <a:t>Expression Tag</a:t>
-          </a:r>
-          <a:endParaRPr lang="en-IN" sz="2400" kern="1200"/>
-        </a:p>
-      </dsp:txBody>
-      <dsp:txXfrm>
-        <a:off x="1888769" y="1020955"/>
-        <a:ext cx="3517228" cy="688960"/>
-      </dsp:txXfrm>
-    </dsp:sp>
-    <dsp:sp modelId="{3853D9D4-6FE3-4277-A423-A92D1183632A}">
-      <dsp:nvSpPr>
-        <dsp:cNvPr id="0" name=""/>
-        <dsp:cNvSpPr/>
-      </dsp:nvSpPr>
-      <dsp:spPr>
-        <a:xfrm>
-          <a:off x="1756995" y="1709915"/>
-          <a:ext cx="7027980" cy="0"/>
-        </a:xfrm>
-        <a:prstGeom prst="line">
-          <a:avLst/>
-        </a:prstGeom>
-        <a:solidFill>
-          <a:schemeClr val="accent1">
-            <a:hueOff val="0"/>
-            <a:satOff val="0"/>
-            <a:lumOff val="0"/>
-            <a:alphaOff val="0"/>
-          </a:schemeClr>
-        </a:solidFill>
-        <a:ln w="25400" cap="flat" cmpd="sng" algn="ctr">
-          <a:solidFill>
-            <a:schemeClr val="accent1">
-              <a:tint val="50000"/>
-              <a:hueOff val="0"/>
-              <a:satOff val="0"/>
-              <a:lumOff val="0"/>
-              <a:alphaOff val="0"/>
-            </a:schemeClr>
-          </a:solidFill>
-          <a:prstDash val="solid"/>
-        </a:ln>
-        <a:effectLst/>
-      </dsp:spPr>
-      <dsp:style>
-        <a:lnRef idx="2">
-          <a:scrgbClr r="0" g="0" b="0"/>
-        </a:lnRef>
-        <a:fillRef idx="1">
-          <a:scrgbClr r="0" g="0" b="0"/>
-        </a:fillRef>
-        <a:effectRef idx="0">
-          <a:scrgbClr r="0" g="0" b="0"/>
-        </a:effectRef>
-        <a:fontRef idx="minor"/>
-      </dsp:style>
-    </dsp:sp>
-    <dsp:sp modelId="{F1F43E86-D782-4EAB-AF8E-A92411B986FE}">
-      <dsp:nvSpPr>
-        <dsp:cNvPr id="0" name=""/>
-        <dsp:cNvSpPr/>
-      </dsp:nvSpPr>
-      <dsp:spPr>
-        <a:xfrm>
-          <a:off x="1888769" y="1836814"/>
-          <a:ext cx="2210299" cy="748146"/>
-        </a:xfrm>
-        <a:prstGeom prst="rect">
-          <a:avLst/>
-        </a:prstGeom>
-        <a:noFill/>
-        <a:ln>
-          <a:noFill/>
-        </a:ln>
-        <a:effectLst/>
-      </dsp:spPr>
-      <dsp:style>
-        <a:lnRef idx="0">
-          <a:scrgbClr r="0" g="0" b="0"/>
-        </a:lnRef>
-        <a:fillRef idx="0">
-          <a:scrgbClr r="0" g="0" b="0"/>
-        </a:fillRef>
-        <a:effectRef idx="0">
-          <a:scrgbClr r="0" g="0" b="0"/>
-        </a:effectRef>
-        <a:fontRef idx="minor"/>
-      </dsp:style>
-      <dsp:txBody>
-        <a:bodyPr spcFirstLastPara="0" vert="horz" wrap="square" lIns="91440" tIns="91440" rIns="91440" bIns="91440" numCol="1" spcCol="1270" anchor="t" anchorCtr="0">
-          <a:noAutofit/>
-        </a:bodyPr>
-        <a:lstStyle/>
-        <a:p>
-          <a:pPr lvl="0" algn="l" defTabSz="1066800">
-            <a:lnSpc>
-              <a:spcPct val="90000"/>
-            </a:lnSpc>
-            <a:spcBef>
-              <a:spcPct val="0"/>
-            </a:spcBef>
-            <a:spcAft>
-              <a:spcPct val="35000"/>
-            </a:spcAft>
-          </a:pPr>
-          <a:r>
-            <a:rPr lang="en-US" sz="2400" kern="1200" smtClean="0"/>
-            <a:t>Scriptlet Tag</a:t>
-          </a:r>
-          <a:endParaRPr lang="en-IN" sz="2400" kern="1200"/>
-        </a:p>
-      </dsp:txBody>
-      <dsp:txXfrm>
-        <a:off x="1888769" y="1836814"/>
-        <a:ext cx="2210299" cy="748146"/>
-      </dsp:txXfrm>
-    </dsp:sp>
-    <dsp:sp modelId="{39241DEB-5333-4D9A-A5BC-B5B002FFDF9E}">
-      <dsp:nvSpPr>
-        <dsp:cNvPr id="0" name=""/>
-        <dsp:cNvSpPr/>
-      </dsp:nvSpPr>
-      <dsp:spPr>
-        <a:xfrm>
-          <a:off x="1756995" y="2584961"/>
-          <a:ext cx="7027980" cy="0"/>
-        </a:xfrm>
-        <a:prstGeom prst="line">
-          <a:avLst/>
-        </a:prstGeom>
-        <a:solidFill>
-          <a:schemeClr val="accent1">
-            <a:hueOff val="0"/>
-            <a:satOff val="0"/>
-            <a:lumOff val="0"/>
-            <a:alphaOff val="0"/>
-          </a:schemeClr>
-        </a:solidFill>
-        <a:ln w="25400" cap="flat" cmpd="sng" algn="ctr">
-          <a:solidFill>
-            <a:schemeClr val="accent1">
-              <a:tint val="50000"/>
-              <a:hueOff val="0"/>
-              <a:satOff val="0"/>
-              <a:lumOff val="0"/>
-              <a:alphaOff val="0"/>
-            </a:schemeClr>
-          </a:solidFill>
-          <a:prstDash val="solid"/>
-        </a:ln>
-        <a:effectLst/>
-      </dsp:spPr>
-      <dsp:style>
-        <a:lnRef idx="2">
-          <a:scrgbClr r="0" g="0" b="0"/>
-        </a:lnRef>
-        <a:fillRef idx="1">
-          <a:scrgbClr r="0" g="0" b="0"/>
-        </a:fillRef>
-        <a:effectRef idx="0">
-          <a:scrgbClr r="0" g="0" b="0"/>
-        </a:effectRef>
-        <a:fontRef idx="minor"/>
-      </dsp:style>
-    </dsp:sp>
-    <dsp:sp modelId="{CCE0FA9A-1699-48BD-9213-22E032F95771}">
-      <dsp:nvSpPr>
-        <dsp:cNvPr id="0" name=""/>
-        <dsp:cNvSpPr/>
-      </dsp:nvSpPr>
-      <dsp:spPr>
-        <a:xfrm>
-          <a:off x="1888769" y="2711860"/>
-          <a:ext cx="2210299" cy="944890"/>
-        </a:xfrm>
-        <a:prstGeom prst="rect">
-          <a:avLst/>
-        </a:prstGeom>
-        <a:noFill/>
-        <a:ln>
-          <a:noFill/>
-        </a:ln>
-        <a:effectLst/>
-      </dsp:spPr>
-      <dsp:style>
-        <a:lnRef idx="0">
-          <a:scrgbClr r="0" g="0" b="0"/>
-        </a:lnRef>
-        <a:fillRef idx="0">
-          <a:scrgbClr r="0" g="0" b="0"/>
-        </a:fillRef>
-        <a:effectRef idx="0">
-          <a:scrgbClr r="0" g="0" b="0"/>
-        </a:effectRef>
-        <a:fontRef idx="minor"/>
-      </dsp:style>
-      <dsp:txBody>
-        <a:bodyPr spcFirstLastPara="0" vert="horz" wrap="square" lIns="91440" tIns="91440" rIns="91440" bIns="91440" numCol="1" spcCol="1270" anchor="t" anchorCtr="0">
-          <a:noAutofit/>
-        </a:bodyPr>
-        <a:lstStyle/>
-        <a:p>
-          <a:pPr lvl="0" algn="l" defTabSz="1066800">
-            <a:lnSpc>
-              <a:spcPct val="90000"/>
-            </a:lnSpc>
-            <a:spcBef>
-              <a:spcPct val="0"/>
-            </a:spcBef>
-            <a:spcAft>
-              <a:spcPct val="35000"/>
-            </a:spcAft>
-          </a:pPr>
-          <a:r>
-            <a:rPr lang="en-US" sz="2400" kern="1200" smtClean="0"/>
-            <a:t>Action Tag</a:t>
-          </a:r>
-          <a:endParaRPr lang="en-IN" sz="2400" kern="1200"/>
-        </a:p>
-      </dsp:txBody>
-      <dsp:txXfrm>
-        <a:off x="1888769" y="2711860"/>
-        <a:ext cx="2210299" cy="944890"/>
-      </dsp:txXfrm>
-    </dsp:sp>
-    <dsp:sp modelId="{03F71D1C-52E7-45E9-95DC-5D8FB444915D}">
-      <dsp:nvSpPr>
-        <dsp:cNvPr id="0" name=""/>
-        <dsp:cNvSpPr/>
-      </dsp:nvSpPr>
-      <dsp:spPr>
-        <a:xfrm>
-          <a:off x="4176471" y="2567779"/>
-          <a:ext cx="2210299" cy="368591"/>
-        </a:xfrm>
-        <a:prstGeom prst="rect">
-          <a:avLst/>
-        </a:prstGeom>
-        <a:noFill/>
-        <a:ln>
-          <a:noFill/>
-        </a:ln>
-        <a:effectLst/>
-      </dsp:spPr>
-      <dsp:style>
-        <a:lnRef idx="0">
-          <a:scrgbClr r="0" g="0" b="0"/>
-        </a:lnRef>
-        <a:fillRef idx="0">
-          <a:scrgbClr r="0" g="0" b="0"/>
-        </a:fillRef>
-        <a:effectRef idx="0">
-          <a:scrgbClr r="0" g="0" b="0"/>
-        </a:effectRef>
-        <a:fontRef idx="minor"/>
-      </dsp:style>
-      <dsp:txBody>
-        <a:bodyPr spcFirstLastPara="0" vert="horz" wrap="square" lIns="68580" tIns="68580" rIns="68580" bIns="68580" numCol="1" spcCol="1270" anchor="t" anchorCtr="0">
-          <a:noAutofit/>
-        </a:bodyPr>
-        <a:lstStyle/>
-        <a:p>
-          <a:pPr lvl="0" algn="l" defTabSz="800100">
-            <a:lnSpc>
-              <a:spcPct val="90000"/>
-            </a:lnSpc>
-            <a:spcBef>
-              <a:spcPct val="0"/>
-            </a:spcBef>
-            <a:spcAft>
-              <a:spcPct val="35000"/>
-            </a:spcAft>
-          </a:pPr>
-          <a:r>
-            <a:rPr lang="en-US" sz="1800" kern="1200" smtClean="0"/>
-            <a:t>Include Action</a:t>
-          </a:r>
-          <a:endParaRPr lang="en-IN" sz="1800" kern="1200"/>
-        </a:p>
-      </dsp:txBody>
-      <dsp:txXfrm>
-        <a:off x="4176471" y="2567779"/>
-        <a:ext cx="2210299" cy="368591"/>
-      </dsp:txXfrm>
-    </dsp:sp>
-    <dsp:sp modelId="{EAF9631E-B57D-49FF-8891-7216FCA17ADF}">
-      <dsp:nvSpPr>
-        <dsp:cNvPr id="0" name=""/>
-        <dsp:cNvSpPr/>
-      </dsp:nvSpPr>
-      <dsp:spPr>
-        <a:xfrm>
-          <a:off x="4100826" y="2986188"/>
-          <a:ext cx="4684149" cy="0"/>
-        </a:xfrm>
-        <a:prstGeom prst="line">
-          <a:avLst/>
-        </a:prstGeom>
-        <a:solidFill>
-          <a:schemeClr val="accent1">
-            <a:hueOff val="0"/>
-            <a:satOff val="0"/>
-            <a:lumOff val="0"/>
-            <a:alphaOff val="0"/>
-          </a:schemeClr>
-        </a:solidFill>
-        <a:ln w="25400" cap="flat" cmpd="sng" algn="ctr">
-          <a:solidFill>
-            <a:schemeClr val="accent1">
-              <a:tint val="50000"/>
-              <a:hueOff val="0"/>
-              <a:satOff val="0"/>
-              <a:lumOff val="0"/>
-              <a:alphaOff val="0"/>
-            </a:schemeClr>
-          </a:solidFill>
-          <a:prstDash val="solid"/>
-        </a:ln>
-        <a:effectLst/>
-      </dsp:spPr>
-      <dsp:style>
-        <a:lnRef idx="2">
-          <a:scrgbClr r="0" g="0" b="0"/>
-        </a:lnRef>
-        <a:fillRef idx="1">
-          <a:scrgbClr r="0" g="0" b="0"/>
-        </a:fillRef>
-        <a:effectRef idx="0">
-          <a:scrgbClr r="0" g="0" b="0"/>
-        </a:effectRef>
-        <a:fontRef idx="minor"/>
-      </dsp:style>
-    </dsp:sp>
-    <dsp:sp modelId="{55EEFA35-58E9-46AC-AC62-F13AB1DB4C2E}">
-      <dsp:nvSpPr>
-        <dsp:cNvPr id="0" name=""/>
-        <dsp:cNvSpPr/>
-      </dsp:nvSpPr>
-      <dsp:spPr>
-        <a:xfrm>
-          <a:off x="4176471" y="2987789"/>
-          <a:ext cx="2210299" cy="336231"/>
-        </a:xfrm>
-        <a:prstGeom prst="rect">
-          <a:avLst/>
-        </a:prstGeom>
-        <a:noFill/>
-        <a:ln>
-          <a:noFill/>
-        </a:ln>
-        <a:effectLst/>
-      </dsp:spPr>
-      <dsp:style>
-        <a:lnRef idx="0">
-          <a:scrgbClr r="0" g="0" b="0"/>
-        </a:lnRef>
-        <a:fillRef idx="0">
-          <a:scrgbClr r="0" g="0" b="0"/>
-        </a:fillRef>
-        <a:effectRef idx="0">
-          <a:scrgbClr r="0" g="0" b="0"/>
-        </a:effectRef>
-        <a:fontRef idx="minor"/>
-      </dsp:style>
-      <dsp:txBody>
-        <a:bodyPr spcFirstLastPara="0" vert="horz" wrap="square" lIns="68580" tIns="68580" rIns="68580" bIns="68580" numCol="1" spcCol="1270" anchor="t" anchorCtr="0">
-          <a:noAutofit/>
-        </a:bodyPr>
-        <a:lstStyle/>
-        <a:p>
-          <a:pPr lvl="0" algn="l" defTabSz="800100">
-            <a:lnSpc>
-              <a:spcPct val="90000"/>
-            </a:lnSpc>
-            <a:spcBef>
-              <a:spcPct val="0"/>
-            </a:spcBef>
-            <a:spcAft>
-              <a:spcPct val="35000"/>
-            </a:spcAft>
-          </a:pPr>
-          <a:r>
-            <a:rPr lang="en-US" sz="1800" kern="1200" smtClean="0"/>
-            <a:t>Forward Action</a:t>
-          </a:r>
-          <a:endParaRPr lang="en-IN" sz="1800" kern="1200"/>
-        </a:p>
-      </dsp:txBody>
-      <dsp:txXfrm>
-        <a:off x="4176471" y="2987789"/>
-        <a:ext cx="2210299" cy="336231"/>
-      </dsp:txXfrm>
-    </dsp:sp>
-    <dsp:sp modelId="{FB9A7791-8308-4A0C-B210-A522A9CB0092}">
-      <dsp:nvSpPr>
-        <dsp:cNvPr id="0" name=""/>
-        <dsp:cNvSpPr/>
-      </dsp:nvSpPr>
-      <dsp:spPr>
-        <a:xfrm>
-          <a:off x="4099069" y="3416683"/>
-          <a:ext cx="4684149" cy="0"/>
-        </a:xfrm>
-        <a:prstGeom prst="line">
-          <a:avLst/>
-        </a:prstGeom>
-        <a:solidFill>
-          <a:schemeClr val="accent1">
-            <a:hueOff val="0"/>
-            <a:satOff val="0"/>
-            <a:lumOff val="0"/>
-            <a:alphaOff val="0"/>
-          </a:schemeClr>
-        </a:solidFill>
-        <a:ln w="25400" cap="flat" cmpd="sng" algn="ctr">
-          <a:solidFill>
-            <a:schemeClr val="accent1">
-              <a:tint val="50000"/>
-              <a:hueOff val="0"/>
-              <a:satOff val="0"/>
-              <a:lumOff val="0"/>
-              <a:alphaOff val="0"/>
-            </a:schemeClr>
-          </a:solidFill>
-          <a:prstDash val="solid"/>
-        </a:ln>
-        <a:effectLst/>
-      </dsp:spPr>
-      <dsp:style>
-        <a:lnRef idx="2">
-          <a:scrgbClr r="0" g="0" b="0"/>
-        </a:lnRef>
-        <a:fillRef idx="1">
-          <a:scrgbClr r="0" g="0" b="0"/>
-        </a:fillRef>
-        <a:effectRef idx="0">
-          <a:scrgbClr r="0" g="0" b="0"/>
-        </a:effectRef>
-        <a:fontRef idx="minor"/>
-      </dsp:style>
-    </dsp:sp>
-    <dsp:sp modelId="{55C9695D-B5C1-4239-ABAB-D1D19DE97834}">
-      <dsp:nvSpPr>
-        <dsp:cNvPr id="0" name=""/>
-        <dsp:cNvSpPr/>
-      </dsp:nvSpPr>
-      <dsp:spPr>
-        <a:xfrm>
-          <a:off x="4230844" y="3416683"/>
-          <a:ext cx="2210299" cy="341028"/>
-        </a:xfrm>
-        <a:prstGeom prst="rect">
-          <a:avLst/>
-        </a:prstGeom>
-        <a:noFill/>
-        <a:ln>
-          <a:noFill/>
-        </a:ln>
-        <a:effectLst/>
-      </dsp:spPr>
-      <dsp:style>
-        <a:lnRef idx="0">
-          <a:scrgbClr r="0" g="0" b="0"/>
-        </a:lnRef>
-        <a:fillRef idx="0">
-          <a:scrgbClr r="0" g="0" b="0"/>
-        </a:fillRef>
-        <a:effectRef idx="0">
-          <a:scrgbClr r="0" g="0" b="0"/>
-        </a:effectRef>
-        <a:fontRef idx="minor"/>
-      </dsp:style>
-      <dsp:txBody>
-        <a:bodyPr spcFirstLastPara="0" vert="horz" wrap="square" lIns="68580" tIns="68580" rIns="68580" bIns="68580" numCol="1" spcCol="1270" anchor="t" anchorCtr="0">
-          <a:noAutofit/>
-        </a:bodyPr>
-        <a:lstStyle/>
-        <a:p>
-          <a:pPr lvl="0" algn="l" defTabSz="800100">
-            <a:lnSpc>
-              <a:spcPct val="90000"/>
-            </a:lnSpc>
-            <a:spcBef>
-              <a:spcPct val="0"/>
-            </a:spcBef>
-            <a:spcAft>
-              <a:spcPct val="35000"/>
-            </a:spcAft>
-          </a:pPr>
-          <a:r>
-            <a:rPr lang="en-US" sz="1800" kern="1200" smtClean="0"/>
-            <a:t>Use Bean action</a:t>
-          </a:r>
-          <a:endParaRPr lang="en-IN" sz="1800" kern="1200"/>
-        </a:p>
-      </dsp:txBody>
-      <dsp:txXfrm>
-        <a:off x="4230844" y="3416683"/>
-        <a:ext cx="2210299" cy="341028"/>
-      </dsp:txXfrm>
-    </dsp:sp>
-    <dsp:sp modelId="{8AFC49EE-054E-4DD8-BCBF-B6ACB180A2CC}">
-      <dsp:nvSpPr>
-        <dsp:cNvPr id="0" name=""/>
-        <dsp:cNvSpPr/>
-      </dsp:nvSpPr>
-      <dsp:spPr>
-        <a:xfrm>
-          <a:off x="1756995" y="3757711"/>
-          <a:ext cx="7027980" cy="0"/>
-        </a:xfrm>
-        <a:prstGeom prst="line">
-          <a:avLst/>
-        </a:prstGeom>
-        <a:solidFill>
-          <a:schemeClr val="accent1">
-            <a:hueOff val="0"/>
-            <a:satOff val="0"/>
-            <a:lumOff val="0"/>
-            <a:alphaOff val="0"/>
-          </a:schemeClr>
-        </a:solidFill>
-        <a:ln w="25400" cap="flat" cmpd="sng" algn="ctr">
-          <a:solidFill>
-            <a:schemeClr val="accent1">
-              <a:tint val="50000"/>
-              <a:hueOff val="0"/>
-              <a:satOff val="0"/>
-              <a:lumOff val="0"/>
-              <a:alphaOff val="0"/>
-            </a:schemeClr>
-          </a:solidFill>
-          <a:prstDash val="solid"/>
-        </a:ln>
-        <a:effectLst/>
-      </dsp:spPr>
-      <dsp:style>
-        <a:lnRef idx="2">
-          <a:scrgbClr r="0" g="0" b="0"/>
-        </a:lnRef>
-        <a:fillRef idx="1">
-          <a:scrgbClr r="0" g="0" b="0"/>
-        </a:fillRef>
-        <a:effectRef idx="0">
-          <a:scrgbClr r="0" g="0" b="0"/>
-        </a:effectRef>
-        <a:fontRef idx="minor"/>
-      </dsp:style>
-    </dsp:sp>
-    <dsp:sp modelId="{FDD34689-47E6-47F4-87C9-73FAFDF07A4B}">
-      <dsp:nvSpPr>
-        <dsp:cNvPr id="0" name=""/>
-        <dsp:cNvSpPr/>
-      </dsp:nvSpPr>
-      <dsp:spPr>
-        <a:xfrm>
-          <a:off x="1888769" y="3884610"/>
-          <a:ext cx="2210299" cy="755963"/>
-        </a:xfrm>
-        <a:prstGeom prst="rect">
-          <a:avLst/>
-        </a:prstGeom>
-        <a:noFill/>
-        <a:ln>
-          <a:noFill/>
-        </a:ln>
-        <a:effectLst/>
-      </dsp:spPr>
-      <dsp:style>
-        <a:lnRef idx="0">
-          <a:scrgbClr r="0" g="0" b="0"/>
-        </a:lnRef>
-        <a:fillRef idx="0">
-          <a:scrgbClr r="0" g="0" b="0"/>
-        </a:fillRef>
-        <a:effectRef idx="0">
-          <a:scrgbClr r="0" g="0" b="0"/>
-        </a:effectRef>
-        <a:fontRef idx="minor"/>
-      </dsp:style>
-      <dsp:txBody>
-        <a:bodyPr spcFirstLastPara="0" vert="horz" wrap="square" lIns="91440" tIns="91440" rIns="91440" bIns="91440" numCol="1" spcCol="1270" anchor="t" anchorCtr="0">
-          <a:noAutofit/>
-        </a:bodyPr>
-        <a:lstStyle/>
-        <a:p>
-          <a:pPr lvl="0" algn="l" defTabSz="1066800">
-            <a:lnSpc>
-              <a:spcPct val="90000"/>
-            </a:lnSpc>
-            <a:spcBef>
-              <a:spcPct val="0"/>
-            </a:spcBef>
-            <a:spcAft>
-              <a:spcPct val="35000"/>
-            </a:spcAft>
-          </a:pPr>
-          <a:r>
-            <a:rPr lang="en-US" sz="2400" kern="1200" smtClean="0"/>
-            <a:t>Directive Tag</a:t>
-          </a:r>
-          <a:endParaRPr lang="en-IN" sz="2400" kern="1200"/>
-        </a:p>
-      </dsp:txBody>
-      <dsp:txXfrm>
-        <a:off x="1888769" y="3884610"/>
-        <a:ext cx="2210299" cy="755963"/>
-      </dsp:txXfrm>
-    </dsp:sp>
-    <dsp:sp modelId="{3E57D97D-5DB7-44FF-BD77-8F1BADD4C3CD}">
-      <dsp:nvSpPr>
-        <dsp:cNvPr id="0" name=""/>
-        <dsp:cNvSpPr/>
-      </dsp:nvSpPr>
-      <dsp:spPr>
-        <a:xfrm>
-          <a:off x="4230844" y="3739112"/>
-          <a:ext cx="2210299" cy="298057"/>
-        </a:xfrm>
-        <a:prstGeom prst="rect">
-          <a:avLst/>
-        </a:prstGeom>
-        <a:noFill/>
-        <a:ln>
-          <a:noFill/>
-        </a:ln>
-        <a:effectLst/>
-      </dsp:spPr>
-      <dsp:style>
-        <a:lnRef idx="0">
-          <a:scrgbClr r="0" g="0" b="0"/>
-        </a:lnRef>
-        <a:fillRef idx="0">
-          <a:scrgbClr r="0" g="0" b="0"/>
-        </a:fillRef>
-        <a:effectRef idx="0">
-          <a:scrgbClr r="0" g="0" b="0"/>
-        </a:effectRef>
-        <a:fontRef idx="minor"/>
-      </dsp:style>
-      <dsp:txBody>
-        <a:bodyPr spcFirstLastPara="0" vert="horz" wrap="square" lIns="68580" tIns="68580" rIns="68580" bIns="68580" numCol="1" spcCol="1270" anchor="t" anchorCtr="0">
-          <a:noAutofit/>
-        </a:bodyPr>
-        <a:lstStyle/>
-        <a:p>
-          <a:pPr lvl="0" algn="l" defTabSz="800100">
-            <a:lnSpc>
-              <a:spcPct val="90000"/>
-            </a:lnSpc>
-            <a:spcBef>
-              <a:spcPct val="0"/>
-            </a:spcBef>
-            <a:spcAft>
-              <a:spcPct val="35000"/>
-            </a:spcAft>
-          </a:pPr>
-          <a:r>
-            <a:rPr lang="en-US" sz="1800" kern="1200" smtClean="0"/>
-            <a:t>Include Directive</a:t>
-          </a:r>
-          <a:endParaRPr lang="en-IN" sz="1800" kern="1200"/>
-        </a:p>
-      </dsp:txBody>
-      <dsp:txXfrm>
-        <a:off x="4230844" y="3739112"/>
-        <a:ext cx="2210299" cy="298057"/>
-      </dsp:txXfrm>
-    </dsp:sp>
-    <dsp:sp modelId="{0C7EB07C-DE77-441F-B335-1D549606A4F7}">
-      <dsp:nvSpPr>
-        <dsp:cNvPr id="0" name=""/>
-        <dsp:cNvSpPr/>
-      </dsp:nvSpPr>
-      <dsp:spPr>
-        <a:xfrm>
-          <a:off x="4099069" y="4176463"/>
-          <a:ext cx="4684149" cy="0"/>
-        </a:xfrm>
-        <a:prstGeom prst="line">
-          <a:avLst/>
-        </a:prstGeom>
-        <a:solidFill>
-          <a:schemeClr val="accent1">
-            <a:hueOff val="0"/>
-            <a:satOff val="0"/>
-            <a:lumOff val="0"/>
-            <a:alphaOff val="0"/>
-          </a:schemeClr>
-        </a:solidFill>
-        <a:ln w="25400" cap="flat" cmpd="sng" algn="ctr">
-          <a:solidFill>
-            <a:schemeClr val="accent1">
-              <a:tint val="50000"/>
-              <a:hueOff val="0"/>
-              <a:satOff val="0"/>
-              <a:lumOff val="0"/>
-              <a:alphaOff val="0"/>
-            </a:schemeClr>
-          </a:solidFill>
-          <a:prstDash val="solid"/>
-        </a:ln>
-        <a:effectLst/>
-      </dsp:spPr>
-      <dsp:style>
-        <a:lnRef idx="2">
-          <a:scrgbClr r="0" g="0" b="0"/>
-        </a:lnRef>
-        <a:fillRef idx="1">
-          <a:scrgbClr r="0" g="0" b="0"/>
-        </a:fillRef>
-        <a:effectRef idx="0">
-          <a:scrgbClr r="0" g="0" b="0"/>
-        </a:effectRef>
-        <a:fontRef idx="minor"/>
-      </dsp:style>
-    </dsp:sp>
-    <dsp:sp modelId="{EC65159F-92D8-43A9-81D5-73F701EDF557}">
-      <dsp:nvSpPr>
-        <dsp:cNvPr id="0" name=""/>
-        <dsp:cNvSpPr/>
-      </dsp:nvSpPr>
-      <dsp:spPr>
-        <a:xfrm>
-          <a:off x="4230844" y="4182668"/>
-          <a:ext cx="2210299" cy="404196"/>
-        </a:xfrm>
-        <a:prstGeom prst="rect">
-          <a:avLst/>
-        </a:prstGeom>
-        <a:noFill/>
-        <a:ln>
-          <a:noFill/>
-        </a:ln>
-        <a:effectLst/>
-      </dsp:spPr>
-      <dsp:style>
-        <a:lnRef idx="0">
-          <a:scrgbClr r="0" g="0" b="0"/>
-        </a:lnRef>
-        <a:fillRef idx="0">
-          <a:scrgbClr r="0" g="0" b="0"/>
-        </a:fillRef>
-        <a:effectRef idx="0">
-          <a:scrgbClr r="0" g="0" b="0"/>
-        </a:effectRef>
-        <a:fontRef idx="minor"/>
-      </dsp:style>
-      <dsp:txBody>
-        <a:bodyPr spcFirstLastPara="0" vert="horz" wrap="square" lIns="68580" tIns="68580" rIns="68580" bIns="68580" numCol="1" spcCol="1270" anchor="t" anchorCtr="0">
-          <a:noAutofit/>
-        </a:bodyPr>
-        <a:lstStyle/>
-        <a:p>
-          <a:pPr lvl="0" algn="l" defTabSz="800100">
-            <a:lnSpc>
-              <a:spcPct val="90000"/>
-            </a:lnSpc>
-            <a:spcBef>
-              <a:spcPct val="0"/>
-            </a:spcBef>
-            <a:spcAft>
-              <a:spcPct val="35000"/>
-            </a:spcAft>
-          </a:pPr>
-          <a:r>
-            <a:rPr lang="en-US" sz="1800" kern="1200" smtClean="0"/>
-            <a:t>Tag Lib  Directive</a:t>
-          </a:r>
-          <a:endParaRPr lang="en-IN" sz="1800" kern="1200"/>
-        </a:p>
-      </dsp:txBody>
-      <dsp:txXfrm>
-        <a:off x="4230844" y="4182668"/>
-        <a:ext cx="2210299" cy="404196"/>
-      </dsp:txXfrm>
-    </dsp:sp>
-    <dsp:sp modelId="{BA61FDB8-D2AB-48A6-8B97-2B491F9BFF3C}">
-      <dsp:nvSpPr>
-        <dsp:cNvPr id="0" name=""/>
-        <dsp:cNvSpPr/>
-      </dsp:nvSpPr>
-      <dsp:spPr>
-        <a:xfrm>
-          <a:off x="4099069" y="4586864"/>
-          <a:ext cx="4684149" cy="0"/>
-        </a:xfrm>
-        <a:prstGeom prst="line">
-          <a:avLst/>
-        </a:prstGeom>
-        <a:solidFill>
-          <a:schemeClr val="accent1">
-            <a:hueOff val="0"/>
-            <a:satOff val="0"/>
-            <a:lumOff val="0"/>
-            <a:alphaOff val="0"/>
-          </a:schemeClr>
-        </a:solidFill>
-        <a:ln w="25400" cap="flat" cmpd="sng" algn="ctr">
-          <a:solidFill>
-            <a:schemeClr val="accent1">
-              <a:tint val="50000"/>
-              <a:hueOff val="0"/>
-              <a:satOff val="0"/>
-              <a:lumOff val="0"/>
-              <a:alphaOff val="0"/>
-            </a:schemeClr>
-          </a:solidFill>
-          <a:prstDash val="solid"/>
-        </a:ln>
-        <a:effectLst/>
-      </dsp:spPr>
-      <dsp:style>
-        <a:lnRef idx="2">
-          <a:scrgbClr r="0" g="0" b="0"/>
-        </a:lnRef>
-        <a:fillRef idx="1">
-          <a:scrgbClr r="0" g="0" b="0"/>
-        </a:fillRef>
-        <a:effectRef idx="0">
-          <a:scrgbClr r="0" g="0" b="0"/>
-        </a:effectRef>
-        <a:fontRef idx="minor"/>
-      </dsp:style>
-    </dsp:sp>
-    <dsp:sp modelId="{5CBFEE1F-91F2-4C25-A44B-5F54E616125A}">
-      <dsp:nvSpPr>
-        <dsp:cNvPr id="0" name=""/>
-        <dsp:cNvSpPr/>
-      </dsp:nvSpPr>
-      <dsp:spPr>
-        <a:xfrm>
-          <a:off x="4230844" y="4586864"/>
-          <a:ext cx="2210299" cy="276653"/>
-        </a:xfrm>
-        <a:prstGeom prst="rect">
-          <a:avLst/>
-        </a:prstGeom>
-        <a:noFill/>
-        <a:ln>
-          <a:noFill/>
-        </a:ln>
-        <a:effectLst/>
-      </dsp:spPr>
-      <dsp:style>
-        <a:lnRef idx="0">
-          <a:scrgbClr r="0" g="0" b="0"/>
-        </a:lnRef>
-        <a:fillRef idx="0">
-          <a:scrgbClr r="0" g="0" b="0"/>
-        </a:fillRef>
-        <a:effectRef idx="0">
-          <a:scrgbClr r="0" g="0" b="0"/>
-        </a:effectRef>
-        <a:fontRef idx="minor"/>
-      </dsp:style>
-      <dsp:txBody>
-        <a:bodyPr spcFirstLastPara="0" vert="horz" wrap="square" lIns="68580" tIns="68580" rIns="68580" bIns="68580" numCol="1" spcCol="1270" anchor="t" anchorCtr="0">
-          <a:noAutofit/>
-        </a:bodyPr>
-        <a:lstStyle/>
-        <a:p>
-          <a:pPr lvl="0" algn="l" defTabSz="800100">
-            <a:lnSpc>
-              <a:spcPct val="90000"/>
-            </a:lnSpc>
-            <a:spcBef>
-              <a:spcPct val="0"/>
-            </a:spcBef>
-            <a:spcAft>
-              <a:spcPct val="35000"/>
-            </a:spcAft>
-          </a:pPr>
-          <a:r>
-            <a:rPr lang="en-US" sz="1800" kern="1200" smtClean="0"/>
-            <a:t>Page Directive</a:t>
-          </a:r>
-          <a:endParaRPr lang="en-IN" sz="1800" kern="1200"/>
-        </a:p>
-      </dsp:txBody>
-      <dsp:txXfrm>
-        <a:off x="4230844" y="4586864"/>
-        <a:ext cx="2210299" cy="276653"/>
-      </dsp:txXfrm>
-    </dsp:sp>
-    <dsp:sp modelId="{416CD987-6923-4EAD-B86E-635212A1129F}">
-      <dsp:nvSpPr>
-        <dsp:cNvPr id="0" name=""/>
-        <dsp:cNvSpPr/>
-      </dsp:nvSpPr>
-      <dsp:spPr>
-        <a:xfrm>
-          <a:off x="6572919" y="4586864"/>
-          <a:ext cx="2210299" cy="203737"/>
-        </a:xfrm>
-        <a:prstGeom prst="rect">
-          <a:avLst/>
-        </a:prstGeom>
-        <a:noFill/>
-        <a:ln>
-          <a:noFill/>
-        </a:ln>
-        <a:effectLst/>
-      </dsp:spPr>
-      <dsp:style>
-        <a:lnRef idx="0">
-          <a:scrgbClr r="0" g="0" b="0"/>
-        </a:lnRef>
-        <a:fillRef idx="0">
-          <a:scrgbClr r="0" g="0" b="0"/>
-        </a:fillRef>
-        <a:effectRef idx="0">
-          <a:scrgbClr r="0" g="0" b="0"/>
-        </a:effectRef>
-        <a:fontRef idx="minor"/>
-      </dsp:style>
-      <dsp:txBody>
-        <a:bodyPr spcFirstLastPara="0" vert="horz" wrap="square" lIns="34290" tIns="34290" rIns="34290" bIns="34290" numCol="1" spcCol="1270" anchor="t" anchorCtr="0">
-          <a:noAutofit/>
-        </a:bodyPr>
-        <a:lstStyle/>
-        <a:p>
-          <a:pPr lvl="0" algn="l" defTabSz="400050">
-            <a:lnSpc>
-              <a:spcPct val="90000"/>
-            </a:lnSpc>
-            <a:spcBef>
-              <a:spcPct val="0"/>
-            </a:spcBef>
-            <a:spcAft>
-              <a:spcPct val="35000"/>
-            </a:spcAft>
-          </a:pPr>
-          <a:r>
-            <a:rPr lang="en-IN" sz="900" kern="1200" smtClean="0"/>
-            <a:t>language</a:t>
-          </a:r>
-          <a:endParaRPr lang="en-IN" sz="900" kern="1200"/>
-        </a:p>
-      </dsp:txBody>
-      <dsp:txXfrm>
-        <a:off x="6572919" y="4586864"/>
-        <a:ext cx="2210299" cy="203737"/>
-      </dsp:txXfrm>
-    </dsp:sp>
-    <dsp:sp modelId="{E1893AA1-687E-4083-A66F-387FA7ECC23E}">
-      <dsp:nvSpPr>
-        <dsp:cNvPr id="0" name=""/>
-        <dsp:cNvSpPr/>
-      </dsp:nvSpPr>
-      <dsp:spPr>
-        <a:xfrm>
-          <a:off x="6572919" y="4790602"/>
-          <a:ext cx="2210299" cy="203737"/>
-        </a:xfrm>
-        <a:prstGeom prst="rect">
-          <a:avLst/>
-        </a:prstGeom>
-        <a:noFill/>
-        <a:ln>
-          <a:noFill/>
-        </a:ln>
-        <a:effectLst/>
-      </dsp:spPr>
-      <dsp:style>
-        <a:lnRef idx="0">
-          <a:scrgbClr r="0" g="0" b="0"/>
-        </a:lnRef>
-        <a:fillRef idx="0">
-          <a:scrgbClr r="0" g="0" b="0"/>
-        </a:fillRef>
-        <a:effectRef idx="0">
-          <a:scrgbClr r="0" g="0" b="0"/>
-        </a:effectRef>
-        <a:fontRef idx="minor"/>
-      </dsp:style>
-      <dsp:txBody>
-        <a:bodyPr spcFirstLastPara="0" vert="horz" wrap="square" lIns="34290" tIns="34290" rIns="34290" bIns="34290" numCol="1" spcCol="1270" anchor="t" anchorCtr="0">
-          <a:noAutofit/>
-        </a:bodyPr>
-        <a:lstStyle/>
-        <a:p>
-          <a:pPr lvl="0" algn="l" defTabSz="400050">
-            <a:lnSpc>
-              <a:spcPct val="90000"/>
-            </a:lnSpc>
-            <a:spcBef>
-              <a:spcPct val="0"/>
-            </a:spcBef>
-            <a:spcAft>
-              <a:spcPct val="35000"/>
-            </a:spcAft>
-          </a:pPr>
-          <a:r>
-            <a:rPr lang="en-US" sz="900" kern="1200" smtClean="0"/>
-            <a:t>info</a:t>
-          </a:r>
-          <a:endParaRPr lang="en-IN" sz="900" kern="1200"/>
-        </a:p>
-      </dsp:txBody>
-      <dsp:txXfrm>
-        <a:off x="6572919" y="4790602"/>
-        <a:ext cx="2210299" cy="203737"/>
-      </dsp:txXfrm>
-    </dsp:sp>
-    <dsp:sp modelId="{E1A44A8A-9C2E-4F3D-9B24-CA9A347C2373}">
-      <dsp:nvSpPr>
-        <dsp:cNvPr id="0" name=""/>
-        <dsp:cNvSpPr/>
-      </dsp:nvSpPr>
-      <dsp:spPr>
-        <a:xfrm>
-          <a:off x="6572919" y="4994340"/>
-          <a:ext cx="2210299" cy="203737"/>
-        </a:xfrm>
-        <a:prstGeom prst="rect">
-          <a:avLst/>
-        </a:prstGeom>
-        <a:noFill/>
-        <a:ln>
-          <a:noFill/>
-        </a:ln>
-        <a:effectLst/>
-      </dsp:spPr>
-      <dsp:style>
-        <a:lnRef idx="0">
-          <a:scrgbClr r="0" g="0" b="0"/>
-        </a:lnRef>
-        <a:fillRef idx="0">
-          <a:scrgbClr r="0" g="0" b="0"/>
-        </a:fillRef>
-        <a:effectRef idx="0">
-          <a:scrgbClr r="0" g="0" b="0"/>
-        </a:effectRef>
-        <a:fontRef idx="minor"/>
-      </dsp:style>
-      <dsp:txBody>
-        <a:bodyPr spcFirstLastPara="0" vert="horz" wrap="square" lIns="34290" tIns="34290" rIns="34290" bIns="34290" numCol="1" spcCol="1270" anchor="t" anchorCtr="0">
-          <a:noAutofit/>
-        </a:bodyPr>
-        <a:lstStyle/>
-        <a:p>
-          <a:pPr lvl="0" algn="l" defTabSz="400050">
-            <a:lnSpc>
-              <a:spcPct val="90000"/>
-            </a:lnSpc>
-            <a:spcBef>
-              <a:spcPct val="0"/>
-            </a:spcBef>
-            <a:spcAft>
-              <a:spcPct val="35000"/>
-            </a:spcAft>
-          </a:pPr>
-          <a:r>
-            <a:rPr lang="en-IN" sz="900" b="1" kern="1200" smtClean="0"/>
-            <a:t>contentType</a:t>
-          </a:r>
-          <a:endParaRPr lang="en-IN" sz="900" kern="1200"/>
-        </a:p>
-      </dsp:txBody>
-      <dsp:txXfrm>
-        <a:off x="6572919" y="4994340"/>
-        <a:ext cx="2210299" cy="203737"/>
-      </dsp:txXfrm>
-    </dsp:sp>
-    <dsp:sp modelId="{B05CE4E5-CFE1-4B66-A141-3243BAED9E53}">
-      <dsp:nvSpPr>
-        <dsp:cNvPr id="0" name=""/>
-        <dsp:cNvSpPr/>
-      </dsp:nvSpPr>
-      <dsp:spPr>
-        <a:xfrm>
-          <a:off x="6572919" y="5198078"/>
-          <a:ext cx="2210299" cy="203737"/>
-        </a:xfrm>
-        <a:prstGeom prst="rect">
-          <a:avLst/>
-        </a:prstGeom>
-        <a:noFill/>
-        <a:ln>
-          <a:noFill/>
-        </a:ln>
-        <a:effectLst/>
-      </dsp:spPr>
-      <dsp:style>
-        <a:lnRef idx="0">
-          <a:scrgbClr r="0" g="0" b="0"/>
-        </a:lnRef>
-        <a:fillRef idx="0">
-          <a:scrgbClr r="0" g="0" b="0"/>
-        </a:fillRef>
-        <a:effectRef idx="0">
-          <a:scrgbClr r="0" g="0" b="0"/>
-        </a:effectRef>
-        <a:fontRef idx="minor"/>
-      </dsp:style>
-      <dsp:txBody>
-        <a:bodyPr spcFirstLastPara="0" vert="horz" wrap="square" lIns="34290" tIns="34290" rIns="34290" bIns="34290" numCol="1" spcCol="1270" anchor="t" anchorCtr="0">
-          <a:noAutofit/>
-        </a:bodyPr>
-        <a:lstStyle/>
-        <a:p>
-          <a:pPr lvl="0" algn="l" defTabSz="400050">
-            <a:lnSpc>
-              <a:spcPct val="90000"/>
-            </a:lnSpc>
-            <a:spcBef>
-              <a:spcPct val="0"/>
-            </a:spcBef>
-            <a:spcAft>
-              <a:spcPct val="35000"/>
-            </a:spcAft>
-          </a:pPr>
-          <a:r>
-            <a:rPr lang="en-IN" sz="900" b="1" kern="1200" smtClean="0"/>
-            <a:t>import</a:t>
-          </a:r>
-          <a:endParaRPr lang="en-IN" sz="900" kern="1200"/>
-        </a:p>
-      </dsp:txBody>
-      <dsp:txXfrm>
-        <a:off x="6572919" y="5198078"/>
-        <a:ext cx="2210299" cy="203737"/>
-      </dsp:txXfrm>
-    </dsp:sp>
-    <dsp:sp modelId="{58386BAA-78BD-4B1F-9A60-D1A0DA65D642}">
-      <dsp:nvSpPr>
-        <dsp:cNvPr id="0" name=""/>
-        <dsp:cNvSpPr/>
-      </dsp:nvSpPr>
-      <dsp:spPr>
-        <a:xfrm>
-          <a:off x="6572919" y="5401815"/>
-          <a:ext cx="2210299" cy="203737"/>
-        </a:xfrm>
-        <a:prstGeom prst="rect">
-          <a:avLst/>
-        </a:prstGeom>
-        <a:noFill/>
-        <a:ln>
-          <a:noFill/>
-        </a:ln>
-        <a:effectLst/>
-      </dsp:spPr>
-      <dsp:style>
-        <a:lnRef idx="0">
-          <a:scrgbClr r="0" g="0" b="0"/>
-        </a:lnRef>
-        <a:fillRef idx="0">
-          <a:scrgbClr r="0" g="0" b="0"/>
-        </a:fillRef>
-        <a:effectRef idx="0">
-          <a:scrgbClr r="0" g="0" b="0"/>
-        </a:effectRef>
-        <a:fontRef idx="minor"/>
-      </dsp:style>
-      <dsp:txBody>
-        <a:bodyPr spcFirstLastPara="0" vert="horz" wrap="square" lIns="34290" tIns="34290" rIns="34290" bIns="34290" numCol="1" spcCol="1270" anchor="t" anchorCtr="0">
-          <a:noAutofit/>
-        </a:bodyPr>
-        <a:lstStyle/>
-        <a:p>
-          <a:pPr lvl="0" algn="l" defTabSz="400050">
-            <a:lnSpc>
-              <a:spcPct val="90000"/>
-            </a:lnSpc>
-            <a:spcBef>
-              <a:spcPct val="0"/>
-            </a:spcBef>
-            <a:spcAft>
-              <a:spcPct val="35000"/>
-            </a:spcAft>
-          </a:pPr>
-          <a:r>
-            <a:rPr lang="en-IN" sz="900" kern="1200" smtClean="0"/>
-            <a:t>extends</a:t>
-          </a:r>
-          <a:endParaRPr lang="en-IN" sz="900" kern="1200"/>
-        </a:p>
-      </dsp:txBody>
-      <dsp:txXfrm>
-        <a:off x="6572919" y="5401815"/>
-        <a:ext cx="2210299" cy="203737"/>
-      </dsp:txXfrm>
-    </dsp:sp>
-    <dsp:sp modelId="{5E1ECCFA-29FB-4E21-A29E-65B0E8E20154}">
-      <dsp:nvSpPr>
-        <dsp:cNvPr id="0" name=""/>
-        <dsp:cNvSpPr/>
-      </dsp:nvSpPr>
-      <dsp:spPr>
-        <a:xfrm>
-          <a:off x="6572919" y="5605553"/>
-          <a:ext cx="2210299" cy="203737"/>
-        </a:xfrm>
-        <a:prstGeom prst="rect">
-          <a:avLst/>
-        </a:prstGeom>
-        <a:noFill/>
-        <a:ln>
-          <a:noFill/>
-        </a:ln>
-        <a:effectLst/>
-      </dsp:spPr>
-      <dsp:style>
-        <a:lnRef idx="0">
-          <a:scrgbClr r="0" g="0" b="0"/>
-        </a:lnRef>
-        <a:fillRef idx="0">
-          <a:scrgbClr r="0" g="0" b="0"/>
-        </a:fillRef>
-        <a:effectRef idx="0">
-          <a:scrgbClr r="0" g="0" b="0"/>
-        </a:effectRef>
-        <a:fontRef idx="minor"/>
-      </dsp:style>
-      <dsp:txBody>
-        <a:bodyPr spcFirstLastPara="0" vert="horz" wrap="square" lIns="34290" tIns="34290" rIns="34290" bIns="34290" numCol="1" spcCol="1270" anchor="t" anchorCtr="0">
-          <a:noAutofit/>
-        </a:bodyPr>
-        <a:lstStyle/>
-        <a:p>
-          <a:pPr lvl="0" algn="l" defTabSz="400050">
-            <a:lnSpc>
-              <a:spcPct val="90000"/>
-            </a:lnSpc>
-            <a:spcBef>
-              <a:spcPct val="0"/>
-            </a:spcBef>
-            <a:spcAft>
-              <a:spcPct val="35000"/>
-            </a:spcAft>
-          </a:pPr>
-          <a:r>
-            <a:rPr lang="en-IN" sz="900" kern="1200" smtClean="0"/>
-            <a:t>buffer</a:t>
-          </a:r>
-          <a:endParaRPr lang="en-IN" sz="900" kern="1200"/>
-        </a:p>
-      </dsp:txBody>
-      <dsp:txXfrm>
-        <a:off x="6572919" y="5605553"/>
-        <a:ext cx="2210299" cy="203737"/>
-      </dsp:txXfrm>
-    </dsp:sp>
-    <dsp:sp modelId="{668195F6-8BDA-4E9E-ACF0-7E7CF0C1CC92}">
-      <dsp:nvSpPr>
-        <dsp:cNvPr id="0" name=""/>
-        <dsp:cNvSpPr/>
-      </dsp:nvSpPr>
-      <dsp:spPr>
-        <a:xfrm>
-          <a:off x="6572919" y="5809291"/>
-          <a:ext cx="2210299" cy="203737"/>
-        </a:xfrm>
-        <a:prstGeom prst="rect">
-          <a:avLst/>
-        </a:prstGeom>
-        <a:noFill/>
-        <a:ln>
-          <a:noFill/>
-        </a:ln>
-        <a:effectLst/>
-      </dsp:spPr>
-      <dsp:style>
-        <a:lnRef idx="0">
-          <a:scrgbClr r="0" g="0" b="0"/>
-        </a:lnRef>
-        <a:fillRef idx="0">
-          <a:scrgbClr r="0" g="0" b="0"/>
-        </a:fillRef>
-        <a:effectRef idx="0">
-          <a:scrgbClr r="0" g="0" b="0"/>
-        </a:effectRef>
-        <a:fontRef idx="minor"/>
-      </dsp:style>
-      <dsp:txBody>
-        <a:bodyPr spcFirstLastPara="0" vert="horz" wrap="square" lIns="34290" tIns="34290" rIns="34290" bIns="34290" numCol="1" spcCol="1270" anchor="t" anchorCtr="0">
-          <a:noAutofit/>
-        </a:bodyPr>
-        <a:lstStyle/>
-        <a:p>
-          <a:pPr lvl="0" algn="l" defTabSz="400050">
-            <a:lnSpc>
-              <a:spcPct val="90000"/>
-            </a:lnSpc>
-            <a:spcBef>
-              <a:spcPct val="0"/>
-            </a:spcBef>
-            <a:spcAft>
-              <a:spcPct val="35000"/>
-            </a:spcAft>
-          </a:pPr>
-          <a:r>
-            <a:rPr lang="en-IN" sz="900" kern="1200" smtClean="0"/>
-            <a:t>autoFlush</a:t>
-          </a:r>
-          <a:endParaRPr lang="en-IN" sz="900" kern="1200"/>
-        </a:p>
-      </dsp:txBody>
-      <dsp:txXfrm>
-        <a:off x="6572919" y="5809291"/>
-        <a:ext cx="2210299" cy="203737"/>
-      </dsp:txXfrm>
-    </dsp:sp>
-    <dsp:sp modelId="{373302D5-1E5B-4FA1-B4E0-337BD755D1DA}">
-      <dsp:nvSpPr>
-        <dsp:cNvPr id="0" name=""/>
-        <dsp:cNvSpPr/>
-      </dsp:nvSpPr>
-      <dsp:spPr>
-        <a:xfrm>
-          <a:off x="6572919" y="6013029"/>
-          <a:ext cx="2210299" cy="203737"/>
-        </a:xfrm>
-        <a:prstGeom prst="rect">
-          <a:avLst/>
-        </a:prstGeom>
-        <a:noFill/>
-        <a:ln>
-          <a:noFill/>
-        </a:ln>
-        <a:effectLst/>
-      </dsp:spPr>
-      <dsp:style>
-        <a:lnRef idx="0">
-          <a:scrgbClr r="0" g="0" b="0"/>
-        </a:lnRef>
-        <a:fillRef idx="0">
-          <a:scrgbClr r="0" g="0" b="0"/>
-        </a:fillRef>
-        <a:effectRef idx="0">
-          <a:scrgbClr r="0" g="0" b="0"/>
-        </a:effectRef>
-        <a:fontRef idx="minor"/>
-      </dsp:style>
-      <dsp:txBody>
-        <a:bodyPr spcFirstLastPara="0" vert="horz" wrap="square" lIns="34290" tIns="34290" rIns="34290" bIns="34290" numCol="1" spcCol="1270" anchor="t" anchorCtr="0">
-          <a:noAutofit/>
-        </a:bodyPr>
-        <a:lstStyle/>
-        <a:p>
-          <a:pPr lvl="0" algn="l" defTabSz="400050">
-            <a:lnSpc>
-              <a:spcPct val="90000"/>
-            </a:lnSpc>
-            <a:spcBef>
-              <a:spcPct val="0"/>
-            </a:spcBef>
-            <a:spcAft>
-              <a:spcPct val="35000"/>
-            </a:spcAft>
-          </a:pPr>
-          <a:r>
-            <a:rPr lang="en-IN" sz="900" b="1" kern="1200" smtClean="0"/>
-            <a:t>session</a:t>
-          </a:r>
-          <a:endParaRPr lang="en-IN" sz="900" kern="1200"/>
-        </a:p>
-      </dsp:txBody>
-      <dsp:txXfrm>
-        <a:off x="6572919" y="6013029"/>
-        <a:ext cx="2210299" cy="203737"/>
-      </dsp:txXfrm>
-    </dsp:sp>
-    <dsp:sp modelId="{ADD3FAE1-ACA0-4F4D-90FD-B3A4CEB35D5C}">
-      <dsp:nvSpPr>
-        <dsp:cNvPr id="0" name=""/>
-        <dsp:cNvSpPr/>
-      </dsp:nvSpPr>
-      <dsp:spPr>
-        <a:xfrm>
-          <a:off x="6572919" y="6216767"/>
-          <a:ext cx="2210299" cy="203737"/>
-        </a:xfrm>
-        <a:prstGeom prst="rect">
-          <a:avLst/>
-        </a:prstGeom>
-        <a:noFill/>
-        <a:ln>
-          <a:noFill/>
-        </a:ln>
-        <a:effectLst/>
-      </dsp:spPr>
-      <dsp:style>
-        <a:lnRef idx="0">
-          <a:scrgbClr r="0" g="0" b="0"/>
-        </a:lnRef>
-        <a:fillRef idx="0">
-          <a:scrgbClr r="0" g="0" b="0"/>
-        </a:fillRef>
-        <a:effectRef idx="0">
-          <a:scrgbClr r="0" g="0" b="0"/>
-        </a:effectRef>
-        <a:fontRef idx="minor"/>
-      </dsp:style>
-      <dsp:txBody>
-        <a:bodyPr spcFirstLastPara="0" vert="horz" wrap="square" lIns="34290" tIns="34290" rIns="34290" bIns="34290" numCol="1" spcCol="1270" anchor="t" anchorCtr="0">
-          <a:noAutofit/>
-        </a:bodyPr>
-        <a:lstStyle/>
-        <a:p>
-          <a:pPr lvl="0" algn="l" defTabSz="400050">
-            <a:lnSpc>
-              <a:spcPct val="90000"/>
-            </a:lnSpc>
-            <a:spcBef>
-              <a:spcPct val="0"/>
-            </a:spcBef>
-            <a:spcAft>
-              <a:spcPct val="35000"/>
-            </a:spcAft>
-          </a:pPr>
-          <a:endParaRPr lang="en-IN" sz="900" kern="1200"/>
-        </a:p>
-      </dsp:txBody>
-      <dsp:txXfrm>
-        <a:off x="6572919" y="6216767"/>
-        <a:ext cx="2210299" cy="203737"/>
-      </dsp:txXfrm>
-    </dsp:sp>
-    <dsp:sp modelId="{125B6ECC-AEB8-460D-97EE-6868513CB36F}">
-      <dsp:nvSpPr>
-        <dsp:cNvPr id="0" name=""/>
-        <dsp:cNvSpPr/>
-      </dsp:nvSpPr>
-      <dsp:spPr>
-        <a:xfrm>
-          <a:off x="1756995" y="6420505"/>
-          <a:ext cx="7027980" cy="0"/>
-        </a:xfrm>
-        <a:prstGeom prst="line">
-          <a:avLst/>
-        </a:prstGeom>
-        <a:solidFill>
-          <a:schemeClr val="accent1">
-            <a:hueOff val="0"/>
-            <a:satOff val="0"/>
-            <a:lumOff val="0"/>
-            <a:alphaOff val="0"/>
-          </a:schemeClr>
-        </a:solidFill>
-        <a:ln w="25400" cap="flat" cmpd="sng" algn="ctr">
-          <a:solidFill>
-            <a:schemeClr val="accent1">
-              <a:tint val="50000"/>
-              <a:hueOff val="0"/>
-              <a:satOff val="0"/>
-              <a:lumOff val="0"/>
-              <a:alphaOff val="0"/>
-            </a:schemeClr>
-          </a:solidFill>
-          <a:prstDash val="solid"/>
-        </a:ln>
-        <a:effectLst/>
-      </dsp:spPr>
-      <dsp:style>
-        <a:lnRef idx="2">
-          <a:scrgbClr r="0" g="0" b="0"/>
-        </a:lnRef>
-        <a:fillRef idx="1">
-          <a:scrgbClr r="0" g="0" b="0"/>
-        </a:fillRef>
-        <a:effectRef idx="0">
-          <a:scrgbClr r="0" g="0" b="0"/>
-        </a:effectRef>
-        <a:fontRef idx="minor"/>
-      </dsp:style>
-    </dsp:sp>
   </dsp:spTree>
 </dsp:drawing>
 </file>
@@ -5752,7 +4015,7 @@
           <a:p>
             <a:fld id="{4D5E6690-03A7-49E8-BBE8-9FAB747999F4}" type="datetimeFigureOut">
               <a:rPr lang="en-US" smtClean="0"/>
-              <a:t>10/25/2016</a:t>
+              <a:t>7/24/2017</a:t>
             </a:fld>
             <a:endParaRPr lang="en-US"/>
           </a:p>
@@ -6730,7 +4993,7 @@
           <a:p>
             <a:fld id="{F91BD43F-C672-4ED4-8CF3-4F6C72EB09E5}" type="datetimeFigureOut">
               <a:rPr lang="en-IN" smtClean="0"/>
-              <a:t>25-10-2016</a:t>
+              <a:t>24-07-2017</a:t>
             </a:fld>
             <a:endParaRPr lang="en-IN" dirty="0"/>
           </a:p>
@@ -6900,7 +5163,7 @@
           <a:p>
             <a:fld id="{F91BD43F-C672-4ED4-8CF3-4F6C72EB09E5}" type="datetimeFigureOut">
               <a:rPr lang="en-IN" smtClean="0"/>
-              <a:t>25-10-2016</a:t>
+              <a:t>24-07-2017</a:t>
             </a:fld>
             <a:endParaRPr lang="en-IN" dirty="0"/>
           </a:p>
@@ -7080,7 +5343,7 @@
           <a:p>
             <a:fld id="{F91BD43F-C672-4ED4-8CF3-4F6C72EB09E5}" type="datetimeFigureOut">
               <a:rPr lang="en-IN" smtClean="0"/>
-              <a:t>25-10-2016</a:t>
+              <a:t>24-07-2017</a:t>
             </a:fld>
             <a:endParaRPr lang="en-IN" dirty="0"/>
           </a:p>
@@ -7250,7 +5513,7 @@
           <a:p>
             <a:fld id="{F91BD43F-C672-4ED4-8CF3-4F6C72EB09E5}" type="datetimeFigureOut">
               <a:rPr lang="en-IN" smtClean="0"/>
-              <a:t>25-10-2016</a:t>
+              <a:t>24-07-2017</a:t>
             </a:fld>
             <a:endParaRPr lang="en-IN" dirty="0"/>
           </a:p>
@@ -7496,7 +5759,7 @@
           <a:p>
             <a:fld id="{F91BD43F-C672-4ED4-8CF3-4F6C72EB09E5}" type="datetimeFigureOut">
               <a:rPr lang="en-IN" smtClean="0"/>
-              <a:t>25-10-2016</a:t>
+              <a:t>24-07-2017</a:t>
             </a:fld>
             <a:endParaRPr lang="en-IN" dirty="0"/>
           </a:p>
@@ -7784,7 +6047,7 @@
           <a:p>
             <a:fld id="{F91BD43F-C672-4ED4-8CF3-4F6C72EB09E5}" type="datetimeFigureOut">
               <a:rPr lang="en-IN" smtClean="0"/>
-              <a:t>25-10-2016</a:t>
+              <a:t>24-07-2017</a:t>
             </a:fld>
             <a:endParaRPr lang="en-IN" dirty="0"/>
           </a:p>
@@ -8206,7 +6469,7 @@
           <a:p>
             <a:fld id="{F91BD43F-C672-4ED4-8CF3-4F6C72EB09E5}" type="datetimeFigureOut">
               <a:rPr lang="en-IN" smtClean="0"/>
-              <a:t>25-10-2016</a:t>
+              <a:t>24-07-2017</a:t>
             </a:fld>
             <a:endParaRPr lang="en-IN" dirty="0"/>
           </a:p>
@@ -8324,7 +6587,7 @@
           <a:p>
             <a:fld id="{F91BD43F-C672-4ED4-8CF3-4F6C72EB09E5}" type="datetimeFigureOut">
               <a:rPr lang="en-IN" smtClean="0"/>
-              <a:t>25-10-2016</a:t>
+              <a:t>24-07-2017</a:t>
             </a:fld>
             <a:endParaRPr lang="en-IN" dirty="0"/>
           </a:p>
@@ -8419,7 +6682,7 @@
           <a:p>
             <a:fld id="{F91BD43F-C672-4ED4-8CF3-4F6C72EB09E5}" type="datetimeFigureOut">
               <a:rPr lang="en-IN" smtClean="0"/>
-              <a:t>25-10-2016</a:t>
+              <a:t>24-07-2017</a:t>
             </a:fld>
             <a:endParaRPr lang="en-IN" dirty="0"/>
           </a:p>
@@ -8696,7 +6959,7 @@
           <a:p>
             <a:fld id="{F91BD43F-C672-4ED4-8CF3-4F6C72EB09E5}" type="datetimeFigureOut">
               <a:rPr lang="en-IN" smtClean="0"/>
-              <a:t>25-10-2016</a:t>
+              <a:t>24-07-2017</a:t>
             </a:fld>
             <a:endParaRPr lang="en-IN" dirty="0"/>
           </a:p>
@@ -8949,7 +7212,7 @@
           <a:p>
             <a:fld id="{F91BD43F-C672-4ED4-8CF3-4F6C72EB09E5}" type="datetimeFigureOut">
               <a:rPr lang="en-IN" smtClean="0"/>
-              <a:t>25-10-2016</a:t>
+              <a:t>24-07-2017</a:t>
             </a:fld>
             <a:endParaRPr lang="en-IN" dirty="0"/>
           </a:p>
@@ -9162,7 +7425,7 @@
           <a:p>
             <a:fld id="{F91BD43F-C672-4ED4-8CF3-4F6C72EB09E5}" type="datetimeFigureOut">
               <a:rPr lang="en-IN" smtClean="0"/>
-              <a:t>25-10-2016</a:t>
+              <a:t>24-07-2017</a:t>
             </a:fld>
             <a:endParaRPr lang="en-IN" dirty="0"/>
           </a:p>
@@ -42513,13 +40776,7 @@
               <a:rPr lang="en-US" sz="1801" dirty="0">
                 <a:latin typeface="Book Antiqua" pitchFamily="18" charset="0"/>
               </a:rPr>
-              <a:t>Browser displays the response. In this case Browser will not have any clue on what went behind the </a:t>
-            </a:r>
-            <a:r>
-              <a:rPr lang="en-US" sz="1801" dirty="0">
-                <a:latin typeface="Book Antiqua" pitchFamily="18" charset="0"/>
-              </a:rPr>
-              <a:t>scene(i.e. </a:t>
+              <a:t>Browser displays the response. In this case Browser will not have any clue on what went behind the scene(i.e. </a:t>
             </a:r>
             <a:r>
               <a:rPr lang="en-US" sz="1801" b="1" u="sng">
@@ -43424,10 +41681,10 @@
             <a:r>
               <a:rPr lang="en-IN" sz="1801" b="1" dirty="0">
                 <a:solidFill>
-                  <a:srgbClr val="FF0000"/>
+                  <a:srgbClr val="002060"/>
                 </a:solidFill>
               </a:rPr>
-              <a:t>Content Type</a:t>
+              <a:t>Actual Content </a:t>
             </a:r>
           </a:p>
           <a:p>
@@ -43436,16 +41693,20 @@
               <a:buAutoNum type="arabicPeriod"/>
             </a:pPr>
             <a:r>
+              <a:rPr lang="en-IN" sz="1801" b="1" dirty="0" smtClean="0">
+                <a:solidFill>
+                  <a:srgbClr val="002060"/>
+                </a:solidFill>
+              </a:rPr>
+              <a:t>Content </a:t>
+            </a:r>
+            <a:r>
               <a:rPr lang="en-IN" sz="1801" b="1" dirty="0">
                 <a:solidFill>
-                  <a:srgbClr val="FF0000"/>
+                  <a:srgbClr val="002060"/>
                 </a:solidFill>
               </a:rPr>
-              <a:t>Actual Content</a:t>
-            </a:r>
-            <a:r>
-              <a:rPr lang="en-IN" sz="1801" b="1" dirty="0"/>
-              <a:t> </a:t>
+              <a:t>Type</a:t>
             </a:r>
           </a:p>
           <a:p>
@@ -43454,8 +41715,12 @@
               <a:buAutoNum type="arabicPeriod"/>
             </a:pPr>
             <a:r>
+              <a:rPr lang="en-IN" sz="1801" b="1" dirty="0" smtClean="0"/>
+              <a:t>Cookies </a:t>
+            </a:r>
+            <a:r>
               <a:rPr lang="en-IN" sz="1801" b="1" dirty="0"/>
-              <a:t>Cookies (if any)</a:t>
+              <a:t>(if any)</a:t>
             </a:r>
           </a:p>
           <a:p>

</xml_diff>